<commit_message>
Notebook pptx-testes fazendo a substituição de todos os cabeçalhos das tabelas, com o mês e ano selecionado. O tratamento está sendo feito nas funções no módulo utils.funcoes_tratamento_pptx.
</commit_message>
<xml_diff>
--- a/files/modelo_apresentacao/Modelo (Novo) GDO 23º BPM.pptx
+++ b/files/modelo_apresentacao/Modelo (Novo) GDO 23º BPM.pptx
@@ -1443,7 +1443,7 @@
         <p:spPr>
           <a:xfrm>
             <a:off x="108360" y="106200"/>
-            <a:ext cx="1743480" cy="713160"/>
+            <a:ext cx="1741680" cy="711360"/>
           </a:xfrm>
           <a:prstGeom prst="rect">
             <a:avLst/>
@@ -1462,7 +1462,7 @@
         <p:spPr>
           <a:xfrm>
             <a:off x="7763400" y="23040"/>
-            <a:ext cx="4205160" cy="639000"/>
+            <a:ext cx="4203360" cy="638280"/>
           </a:xfrm>
           <a:prstGeom prst="rect">
             <a:avLst/>
@@ -1516,7 +1516,7 @@
         <p:spPr>
           <a:xfrm>
             <a:off x="2222640" y="407880"/>
-            <a:ext cx="9770760" cy="360"/>
+            <a:ext cx="9768960" cy="360"/>
           </a:xfrm>
           <a:custGeom>
             <a:avLst/>
@@ -1811,7 +1811,7 @@
         <p:spPr>
           <a:xfrm>
             <a:off x="882720" y="1765440"/>
-            <a:ext cx="10388520" cy="1918440"/>
+            <a:ext cx="10386720" cy="1918440"/>
           </a:xfrm>
           <a:prstGeom prst="rect">
             <a:avLst/>
@@ -1865,7 +1865,7 @@
         <p:spPr>
           <a:xfrm>
             <a:off x="870480" y="6197760"/>
-            <a:ext cx="10216440" cy="455400"/>
+            <a:ext cx="10214640" cy="455400"/>
           </a:xfrm>
           <a:prstGeom prst="rect">
             <a:avLst/>
@@ -1919,7 +1919,7 @@
         <p:spPr>
           <a:xfrm>
             <a:off x="893520" y="4235760"/>
-            <a:ext cx="10388520" cy="759960"/>
+            <a:ext cx="10386720" cy="759960"/>
           </a:xfrm>
           <a:prstGeom prst="rect">
             <a:avLst/>
@@ -2003,7 +2003,7 @@
         <p:spPr>
           <a:xfrm>
             <a:off x="693720" y="2670480"/>
-            <a:ext cx="10747800" cy="2283120"/>
+            <a:ext cx="10746000" cy="2283120"/>
           </a:xfrm>
           <a:prstGeom prst="rect">
             <a:avLst/>
@@ -2100,7 +2100,7 @@
         <p:spPr>
           <a:xfrm>
             <a:off x="15480" y="777600"/>
-            <a:ext cx="12175200" cy="459000"/>
+            <a:ext cx="12173400" cy="459000"/>
           </a:xfrm>
           <a:prstGeom prst="rect">
             <a:avLst/>
@@ -4916,7 +4916,7 @@
         <p:spPr>
           <a:xfrm>
             <a:off x="556920" y="5843880"/>
-            <a:ext cx="5367240" cy="272160"/>
+            <a:ext cx="5365440" cy="272160"/>
           </a:xfrm>
           <a:prstGeom prst="rect">
             <a:avLst/>
@@ -5000,7 +5000,7 @@
         <p:spPr>
           <a:xfrm>
             <a:off x="15480" y="777600"/>
-            <a:ext cx="12175200" cy="459000"/>
+            <a:ext cx="12173400" cy="459000"/>
           </a:xfrm>
           <a:prstGeom prst="rect">
             <a:avLst/>
@@ -5054,7 +5054,7 @@
         <p:spPr>
           <a:xfrm>
             <a:off x="3362760" y="2542320"/>
-            <a:ext cx="5213160" cy="1918440"/>
+            <a:ext cx="5211360" cy="1918440"/>
           </a:xfrm>
           <a:prstGeom prst="rect">
             <a:avLst/>
@@ -5156,7 +5156,7 @@
         <p:spPr>
           <a:xfrm>
             <a:off x="15480" y="777600"/>
-            <a:ext cx="12175200" cy="459000"/>
+            <a:ext cx="12173400" cy="459000"/>
           </a:xfrm>
           <a:prstGeom prst="rect">
             <a:avLst/>
@@ -5874,7 +5874,7 @@
         <p:spPr>
           <a:xfrm>
             <a:off x="556920" y="5843880"/>
-            <a:ext cx="5367240" cy="272160"/>
+            <a:ext cx="5365440" cy="272160"/>
           </a:xfrm>
           <a:prstGeom prst="rect">
             <a:avLst/>
@@ -9043,7 +9043,7 @@
         <p:spPr>
           <a:xfrm>
             <a:off x="-1080" y="767880"/>
-            <a:ext cx="12192120" cy="455400"/>
+            <a:ext cx="12190320" cy="455400"/>
           </a:xfrm>
           <a:prstGeom prst="rect">
             <a:avLst/>
@@ -9097,7 +9097,7 @@
         <p:spPr>
           <a:xfrm>
             <a:off x="3362760" y="2542320"/>
-            <a:ext cx="5213160" cy="1918440"/>
+            <a:ext cx="5211360" cy="1918440"/>
           </a:xfrm>
           <a:prstGeom prst="rect">
             <a:avLst/>
@@ -9199,7 +9199,7 @@
         <p:spPr>
           <a:xfrm>
             <a:off x="2880" y="767880"/>
-            <a:ext cx="12187800" cy="455400"/>
+            <a:ext cx="12186000" cy="455400"/>
           </a:xfrm>
           <a:prstGeom prst="rect">
             <a:avLst/>
@@ -9290,7 +9290,7 @@
                           <a:latin typeface="Arial"/>
                           <a:ea typeface="Arial"/>
                         </a:rPr>
-                        <a:t>MÊS DE ANO (UPPER)</a:t>
+                        <a:t>MÊS ANO</a:t>
                       </a:r>
                       <a:endParaRPr b="0" lang="en-US" sz="1400" spc="-1" strike="noStrike">
                         <a:latin typeface="Arial"/>
@@ -14310,7 +14310,7 @@
         <p:spPr>
           <a:xfrm>
             <a:off x="2880" y="767880"/>
-            <a:ext cx="12187800" cy="455400"/>
+            <a:ext cx="12186000" cy="455400"/>
           </a:xfrm>
           <a:prstGeom prst="rect">
             <a:avLst/>
@@ -14364,7 +14364,7 @@
         <p:spPr>
           <a:xfrm>
             <a:off x="3362760" y="2542320"/>
-            <a:ext cx="5213160" cy="1918440"/>
+            <a:ext cx="5211360" cy="1918440"/>
           </a:xfrm>
           <a:prstGeom prst="rect">
             <a:avLst/>
@@ -14466,7 +14466,7 @@
         <p:spPr>
           <a:xfrm>
             <a:off x="2160" y="764280"/>
-            <a:ext cx="12188880" cy="824760"/>
+            <a:ext cx="12187080" cy="824760"/>
           </a:xfrm>
           <a:prstGeom prst="rect">
             <a:avLst/>
@@ -14520,7 +14520,7 @@
         <p:spPr>
           <a:xfrm>
             <a:off x="741960" y="6570000"/>
-            <a:ext cx="10793880" cy="272160"/>
+            <a:ext cx="10792080" cy="272160"/>
           </a:xfrm>
           <a:prstGeom prst="rect">
             <a:avLst/>
@@ -14610,22 +14610,12 @@
                       <a:r>
                         <a:rPr b="1" lang="pt-BR" sz="1400" spc="-1" strike="noStrike">
                           <a:solidFill>
-                            <a:srgbClr val="ff0000"/>
+                            <a:srgbClr val="000000"/>
                           </a:solidFill>
                           <a:latin typeface="Arial"/>
                           <a:ea typeface="Arial"/>
                         </a:rPr>
-                        <a:t>AGOSTO</a:t>
-                      </a:r>
-                      <a:r>
-                        <a:rPr b="1" lang="pt-BR" sz="1400" spc="-1" strike="noStrike">
-                          <a:solidFill>
-                            <a:srgbClr val="000000"/>
-                          </a:solidFill>
-                          <a:latin typeface="Arial"/>
-                          <a:ea typeface="Arial"/>
-                        </a:rPr>
-                        <a:t> DE 2021</a:t>
+                        <a:t>MÊS ANO</a:t>
                       </a:r>
                       <a:endParaRPr b="0" lang="en-US" sz="1400" spc="-1" strike="noStrike">
                         <a:latin typeface="Arial"/>
@@ -20060,7 +20050,7 @@
         <p:spPr>
           <a:xfrm>
             <a:off x="2160" y="764280"/>
-            <a:ext cx="12188880" cy="459000"/>
+            <a:ext cx="12187080" cy="459000"/>
           </a:xfrm>
           <a:prstGeom prst="rect">
             <a:avLst/>
@@ -20114,7 +20104,7 @@
         <p:spPr>
           <a:xfrm>
             <a:off x="3362760" y="2542320"/>
-            <a:ext cx="5213160" cy="1918440"/>
+            <a:ext cx="5211360" cy="1918440"/>
           </a:xfrm>
           <a:prstGeom prst="rect">
             <a:avLst/>
@@ -20216,7 +20206,7 @@
         <p:spPr>
           <a:xfrm>
             <a:off x="772560" y="2949840"/>
-            <a:ext cx="10668960" cy="2283120"/>
+            <a:ext cx="10667160" cy="2283120"/>
           </a:xfrm>
           <a:prstGeom prst="rect">
             <a:avLst/>
@@ -20313,7 +20303,7 @@
         <p:spPr>
           <a:xfrm>
             <a:off x="1114920" y="955080"/>
-            <a:ext cx="10216440" cy="5573880"/>
+            <a:ext cx="10214640" cy="5573880"/>
           </a:xfrm>
           <a:prstGeom prst="rect">
             <a:avLst/>
@@ -20370,7 +20360,7 @@
             </a:endParaRPr>
           </a:p>
           <a:p>
-            <a:pPr marL="743040" indent="-741960" algn="just">
+            <a:pPr marL="743040" indent="-740160" algn="just">
               <a:lnSpc>
                 <a:spcPct val="100000"/>
               </a:lnSpc>
@@ -20752,7 +20742,7 @@
         <p:spPr>
           <a:xfrm>
             <a:off x="0" y="763920"/>
-            <a:ext cx="12191040" cy="459000"/>
+            <a:ext cx="12189240" cy="459000"/>
           </a:xfrm>
           <a:prstGeom prst="rect">
             <a:avLst/>
@@ -20806,7 +20796,7 @@
         <p:spPr>
           <a:xfrm>
             <a:off x="915840" y="5955480"/>
-            <a:ext cx="1888200" cy="272160"/>
+            <a:ext cx="1886400" cy="272160"/>
           </a:xfrm>
           <a:prstGeom prst="rect">
             <a:avLst/>
@@ -23787,7 +23777,7 @@
         <p:spPr>
           <a:xfrm>
             <a:off x="0" y="763920"/>
-            <a:ext cx="12191040" cy="459000"/>
+            <a:ext cx="12189240" cy="459000"/>
           </a:xfrm>
           <a:prstGeom prst="rect">
             <a:avLst/>
@@ -23841,7 +23831,7 @@
         <p:spPr>
           <a:xfrm>
             <a:off x="3362760" y="2542320"/>
-            <a:ext cx="5213160" cy="1918440"/>
+            <a:ext cx="5211360" cy="1918440"/>
           </a:xfrm>
           <a:prstGeom prst="rect">
             <a:avLst/>
@@ -23943,7 +23933,7 @@
         <p:spPr>
           <a:xfrm>
             <a:off x="772560" y="2949840"/>
-            <a:ext cx="10668960" cy="1551960"/>
+            <a:ext cx="10667160" cy="1551960"/>
           </a:xfrm>
           <a:prstGeom prst="rect">
             <a:avLst/>
@@ -24027,7 +24017,7 @@
         <p:spPr>
           <a:xfrm>
             <a:off x="0" y="781560"/>
-            <a:ext cx="12191040" cy="455400"/>
+            <a:ext cx="12189240" cy="455400"/>
           </a:xfrm>
           <a:prstGeom prst="rect">
             <a:avLst/>
@@ -24081,7 +24071,7 @@
         <p:spPr>
           <a:xfrm>
             <a:off x="1283040" y="5938200"/>
-            <a:ext cx="2937240" cy="272160"/>
+            <a:ext cx="2935440" cy="272160"/>
           </a:xfrm>
           <a:prstGeom prst="rect">
             <a:avLst/>
@@ -27936,7 +27926,7 @@
         <p:spPr>
           <a:xfrm>
             <a:off x="0" y="781560"/>
-            <a:ext cx="12191040" cy="455400"/>
+            <a:ext cx="12189240" cy="455400"/>
           </a:xfrm>
           <a:prstGeom prst="rect">
             <a:avLst/>
@@ -27990,7 +27980,7 @@
         <p:spPr>
           <a:xfrm>
             <a:off x="3362760" y="2542320"/>
-            <a:ext cx="5213160" cy="1918440"/>
+            <a:ext cx="5211360" cy="1918440"/>
           </a:xfrm>
           <a:prstGeom prst="rect">
             <a:avLst/>
@@ -28092,7 +28082,7 @@
         <p:spPr>
           <a:xfrm>
             <a:off x="772560" y="2949840"/>
-            <a:ext cx="10668960" cy="1551960"/>
+            <a:ext cx="10667160" cy="1551960"/>
           </a:xfrm>
           <a:prstGeom prst="rect">
             <a:avLst/>
@@ -28176,7 +28166,7 @@
         <p:spPr>
           <a:xfrm>
             <a:off x="0" y="763920"/>
-            <a:ext cx="12191040" cy="459000"/>
+            <a:ext cx="12189240" cy="459000"/>
           </a:xfrm>
           <a:prstGeom prst="rect">
             <a:avLst/>
@@ -31127,7 +31117,7 @@
         <p:spPr>
           <a:xfrm>
             <a:off x="1283040" y="5938200"/>
-            <a:ext cx="2937240" cy="272160"/>
+            <a:ext cx="2935440" cy="272160"/>
           </a:xfrm>
           <a:prstGeom prst="rect">
             <a:avLst/>
@@ -31211,7 +31201,7 @@
         <p:spPr>
           <a:xfrm>
             <a:off x="3362760" y="2542320"/>
-            <a:ext cx="5213160" cy="1918440"/>
+            <a:ext cx="5211360" cy="1918440"/>
           </a:xfrm>
           <a:prstGeom prst="rect">
             <a:avLst/>
@@ -31283,7 +31273,7 @@
         <p:spPr>
           <a:xfrm>
             <a:off x="0" y="763920"/>
-            <a:ext cx="12191040" cy="459000"/>
+            <a:ext cx="12189240" cy="459000"/>
           </a:xfrm>
           <a:prstGeom prst="rect">
             <a:avLst/>
@@ -31367,7 +31357,7 @@
         <p:spPr>
           <a:xfrm>
             <a:off x="909720" y="2949840"/>
-            <a:ext cx="10216440" cy="1551960"/>
+            <a:ext cx="10214640" cy="1551960"/>
           </a:xfrm>
           <a:prstGeom prst="rect">
             <a:avLst/>
@@ -31464,7 +31454,7 @@
         <p:spPr>
           <a:xfrm>
             <a:off x="1523880" y="604080"/>
-            <a:ext cx="9434880" cy="394560"/>
+            <a:ext cx="9433080" cy="394560"/>
           </a:xfrm>
           <a:prstGeom prst="rect">
             <a:avLst/>
@@ -31517,7 +31507,7 @@
         </p:nvGraphicFramePr>
         <p:xfrm>
           <a:off x="252360" y="1213920"/>
-          <a:ext cx="11634120" cy="5422320"/>
+          <a:ext cx="11634120" cy="5420520"/>
         </p:xfrm>
         <a:graphic>
           <a:graphicData uri="http://schemas.openxmlformats.org/drawingml/2006/table">
@@ -33033,7 +33023,7 @@
                   </a:tcPr>
                 </a:tc>
               </a:tr>
-              <a:tr h="921240">
+              <a:tr h="919440">
                 <a:tc>
                   <a:tcPr marL="91080" marR="91080">
                     <a:lnL w="12240">
@@ -33248,7 +33238,7 @@
         <p:spPr>
           <a:xfrm>
             <a:off x="3403080" y="3349080"/>
-            <a:ext cx="5213160" cy="2832840"/>
+            <a:ext cx="5211360" cy="2832840"/>
           </a:xfrm>
           <a:prstGeom prst="rect">
             <a:avLst/>
@@ -33337,7 +33327,7 @@
         <p:spPr>
           <a:xfrm>
             <a:off x="898560" y="2949840"/>
-            <a:ext cx="10542960" cy="820800"/>
+            <a:ext cx="10541160" cy="820800"/>
           </a:xfrm>
           <a:prstGeom prst="rect">
             <a:avLst/>
@@ -33421,7 +33411,7 @@
         <p:spPr>
           <a:xfrm>
             <a:off x="0" y="837000"/>
-            <a:ext cx="12191040" cy="459000"/>
+            <a:ext cx="12189240" cy="459000"/>
           </a:xfrm>
           <a:prstGeom prst="rect">
             <a:avLst/>
@@ -35295,7 +35285,7 @@
         <p:spPr>
           <a:xfrm>
             <a:off x="1057320" y="2770200"/>
-            <a:ext cx="10514520" cy="1324440"/>
+            <a:ext cx="10512720" cy="1322640"/>
           </a:xfrm>
           <a:prstGeom prst="rect">
             <a:avLst/>
@@ -35349,7 +35339,7 @@
         <p:spPr>
           <a:xfrm>
             <a:off x="425520" y="1265400"/>
-            <a:ext cx="11323800" cy="3135960"/>
+            <a:ext cx="11322000" cy="3134160"/>
           </a:xfrm>
           <a:prstGeom prst="rect">
             <a:avLst/>
@@ -35405,7 +35395,7 @@
         <p:spPr>
           <a:xfrm>
             <a:off x="-2160" y="777600"/>
-            <a:ext cx="12193200" cy="459000"/>
+            <a:ext cx="12191400" cy="459000"/>
           </a:xfrm>
           <a:prstGeom prst="rect">
             <a:avLst/>
@@ -36122,7 +36112,7 @@
         </p:nvGraphicFramePr>
         <p:xfrm>
           <a:off x="248040" y="1410840"/>
-          <a:ext cx="11694960" cy="3857400"/>
+          <a:ext cx="11694960" cy="3863880"/>
         </p:xfrm>
         <a:graphic>
           <a:graphicData uri="http://schemas.openxmlformats.org/drawingml/2006/table">
@@ -36266,14 +36256,91 @@
                       </a:pPr>
                       <a:r>
                         <a:rPr b="1" lang="pt-BR" sz="1400" spc="-1" strike="noStrike">
-                          <a:solidFill>
-                            <a:srgbClr val="ff0000"/>
-                          </a:solidFill>
                           <a:latin typeface="Arial"/>
                           <a:ea typeface="Arial"/>
                         </a:rPr>
-                        <a:t>MÊS </a:t>
-                      </a:r>
+                        <a:t>MÊS ANO</a:t>
+                      </a:r>
+                      <a:endParaRPr b="0" lang="en-US" sz="1400" spc="-1" strike="noStrike">
+                        <a:latin typeface="Arial"/>
+                      </a:endParaRPr>
+                    </a:p>
+                  </a:txBody>
+                  <a:tcPr marL="43920" marR="43920">
+                    <a:lnL w="12240">
+                      <a:solidFill>
+                        <a:srgbClr val="000000"/>
+                      </a:solidFill>
+                    </a:lnL>
+                    <a:lnR w="12240">
+                      <a:solidFill>
+                        <a:srgbClr val="000000"/>
+                      </a:solidFill>
+                    </a:lnR>
+                    <a:lnT w="12240">
+                      <a:solidFill>
+                        <a:srgbClr val="000000"/>
+                      </a:solidFill>
+                    </a:lnT>
+                    <a:lnB w="12240">
+                      <a:solidFill>
+                        <a:srgbClr val="000000"/>
+                      </a:solidFill>
+                    </a:lnB>
+                    <a:solidFill>
+                      <a:srgbClr val="e2f0d9"/>
+                    </a:solidFill>
+                  </a:tcPr>
+                </a:tc>
+                <a:tc hMerge="1">
+                  <a:tcPr marL="90000" marR="90000">
+                    <a:solidFill>
+                      <a:srgbClr val="729fcf"/>
+                    </a:solidFill>
+                  </a:tcPr>
+                </a:tc>
+                <a:tc hMerge="1">
+                  <a:tcPr marL="90000" marR="90000">
+                    <a:solidFill>
+                      <a:srgbClr val="729fcf"/>
+                    </a:solidFill>
+                  </a:tcPr>
+                </a:tc>
+                <a:tc hMerge="1">
+                  <a:tcPr marL="90000" marR="90000">
+                    <a:solidFill>
+                      <a:srgbClr val="729fcf"/>
+                    </a:solidFill>
+                  </a:tcPr>
+                </a:tc>
+                <a:tc hMerge="1">
+                  <a:tcPr marL="90000" marR="90000">
+                    <a:solidFill>
+                      <a:srgbClr val="729fcf"/>
+                    </a:solidFill>
+                  </a:tcPr>
+                </a:tc>
+                <a:tc hMerge="1">
+                  <a:tcPr marL="90000" marR="90000">
+                    <a:solidFill>
+                      <a:srgbClr val="729fcf"/>
+                    </a:solidFill>
+                  </a:tcPr>
+                </a:tc>
+                <a:tc gridSpan="6">
+                  <a:txBody>
+                    <a:bodyPr lIns="43920" rIns="43920">
+                      <a:noAutofit/>
+                    </a:bodyPr>
+                    <a:p>
+                      <a:pPr algn="ctr">
+                        <a:lnSpc>
+                          <a:spcPct val="107000"/>
+                        </a:lnSpc>
+                        <a:tabLst>
+                          <a:tab algn="l" pos="0"/>
+                        </a:tabLst>
+                      </a:pPr>
                       <a:r>
                         <a:rPr b="1" lang="pt-BR" sz="1400" spc="-1" strike="noStrike">
                           <a:solidFill>
@@ -36282,117 +36349,7 @@
                           <a:latin typeface="Arial"/>
                           <a:ea typeface="Arial"/>
                         </a:rPr>
-                        <a:t>ANO</a:t>
-                      </a:r>
-                      <a:endParaRPr b="0" lang="en-US" sz="1400" spc="-1" strike="noStrike">
-                        <a:latin typeface="Arial"/>
-                      </a:endParaRPr>
-                    </a:p>
-                  </a:txBody>
-                  <a:tcPr marL="43920" marR="43920">
-                    <a:lnL w="12240">
-                      <a:solidFill>
-                        <a:srgbClr val="000000"/>
-                      </a:solidFill>
-                    </a:lnL>
-                    <a:lnR w="12240">
-                      <a:solidFill>
-                        <a:srgbClr val="000000"/>
-                      </a:solidFill>
-                    </a:lnR>
-                    <a:lnT w="12240">
-                      <a:solidFill>
-                        <a:srgbClr val="000000"/>
-                      </a:solidFill>
-                    </a:lnT>
-                    <a:lnB w="12240">
-                      <a:solidFill>
-                        <a:srgbClr val="000000"/>
-                      </a:solidFill>
-                    </a:lnB>
-                    <a:solidFill>
-                      <a:srgbClr val="e2f0d9"/>
-                    </a:solidFill>
-                  </a:tcPr>
-                </a:tc>
-                <a:tc hMerge="1">
-                  <a:tcPr marL="90000" marR="90000">
-                    <a:solidFill>
-                      <a:srgbClr val="729fcf"/>
-                    </a:solidFill>
-                  </a:tcPr>
-                </a:tc>
-                <a:tc hMerge="1">
-                  <a:tcPr marL="90000" marR="90000">
-                    <a:solidFill>
-                      <a:srgbClr val="729fcf"/>
-                    </a:solidFill>
-                  </a:tcPr>
-                </a:tc>
-                <a:tc hMerge="1">
-                  <a:tcPr marL="90000" marR="90000">
-                    <a:solidFill>
-                      <a:srgbClr val="729fcf"/>
-                    </a:solidFill>
-                  </a:tcPr>
-                </a:tc>
-                <a:tc hMerge="1">
-                  <a:tcPr marL="90000" marR="90000">
-                    <a:solidFill>
-                      <a:srgbClr val="729fcf"/>
-                    </a:solidFill>
-                  </a:tcPr>
-                </a:tc>
-                <a:tc hMerge="1">
-                  <a:tcPr marL="90000" marR="90000">
-                    <a:solidFill>
-                      <a:srgbClr val="729fcf"/>
-                    </a:solidFill>
-                  </a:tcPr>
-                </a:tc>
-                <a:tc gridSpan="6">
-                  <a:txBody>
-                    <a:bodyPr lIns="43920" rIns="43920">
-                      <a:noAutofit/>
-                    </a:bodyPr>
-                    <a:p>
-                      <a:pPr algn="ctr">
-                        <a:lnSpc>
-                          <a:spcPct val="107000"/>
-                        </a:lnSpc>
-                        <a:tabLst>
-                          <a:tab algn="l" pos="0"/>
-                        </a:tabLst>
-                      </a:pPr>
-                      <a:r>
-                        <a:rPr b="1" lang="pt-BR" sz="1400" spc="-1" strike="noStrike">
-                          <a:solidFill>
-                            <a:srgbClr val="000000"/>
-                          </a:solidFill>
-                          <a:latin typeface="Arial"/>
-                          <a:ea typeface="Arial"/>
-                        </a:rPr>
-                        <a:t>ACUMULADO ANO (JAN A </a:t>
-                      </a:r>
-                      <a:r>
-                        <a:rPr b="1" lang="pt-BR" sz="1400" spc="-1" strike="noStrike">
-                          <a:solidFill>
-                            <a:srgbClr val="ff0000"/>
-                          </a:solidFill>
-                          <a:latin typeface="Arial"/>
-                          <a:ea typeface="Arial"/>
-                        </a:rPr>
-                        <a:t>MÊS</a:t>
-                      </a:r>
-                      <a:r>
-                        <a:rPr b="1" lang="pt-BR" sz="1400" spc="-1" strike="noStrike">
-                          <a:solidFill>
-                            <a:srgbClr val="000000"/>
-                          </a:solidFill>
-                          <a:latin typeface="Arial"/>
-                          <a:ea typeface="Arial"/>
-                        </a:rPr>
-                        <a:t>)</a:t>
+                        <a:t>ACUMULADO ANO (JAN A MÊS)</a:t>
                       </a:r>
                       <a:endParaRPr b="0" lang="en-US" sz="1400" spc="-1" strike="noStrike">
                         <a:latin typeface="Arial"/>
@@ -39510,7 +39467,7 @@
         <p:spPr>
           <a:xfrm>
             <a:off x="556920" y="5843880"/>
-            <a:ext cx="5367240" cy="454680"/>
+            <a:ext cx="5365440" cy="454680"/>
           </a:xfrm>
           <a:prstGeom prst="rect">
             <a:avLst/>
@@ -39617,7 +39574,7 @@
         <p:spPr>
           <a:xfrm>
             <a:off x="3362760" y="2542320"/>
-            <a:ext cx="5213160" cy="1918440"/>
+            <a:ext cx="5211360" cy="1918440"/>
           </a:xfrm>
           <a:prstGeom prst="rect">
             <a:avLst/>
@@ -39689,7 +39646,7 @@
         <p:spPr>
           <a:xfrm>
             <a:off x="-2160" y="777600"/>
-            <a:ext cx="12193200" cy="459000"/>
+            <a:ext cx="12191400" cy="459000"/>
           </a:xfrm>
           <a:prstGeom prst="rect">
             <a:avLst/>
@@ -39773,7 +39730,7 @@
         <p:spPr>
           <a:xfrm>
             <a:off x="-2160" y="777600"/>
-            <a:ext cx="12193200" cy="459000"/>
+            <a:ext cx="12191400" cy="459000"/>
           </a:xfrm>
           <a:prstGeom prst="rect">
             <a:avLst/>
@@ -39826,7 +39783,7 @@
         </p:nvGraphicFramePr>
         <p:xfrm>
           <a:off x="252000" y="1477440"/>
-          <a:ext cx="11694960" cy="3826440"/>
+          <a:ext cx="11694960" cy="3863880"/>
         </p:xfrm>
         <a:graphic>
           <a:graphicData uri="http://schemas.openxmlformats.org/drawingml/2006/table">
@@ -43181,7 +43138,7 @@
         <p:spPr>
           <a:xfrm>
             <a:off x="556920" y="5843880"/>
-            <a:ext cx="5367240" cy="454680"/>
+            <a:ext cx="5365440" cy="454680"/>
           </a:xfrm>
           <a:prstGeom prst="rect">
             <a:avLst/>
@@ -43952,7 +43909,7 @@
         <p:spPr>
           <a:xfrm>
             <a:off x="3362760" y="2542320"/>
-            <a:ext cx="5213160" cy="1918440"/>
+            <a:ext cx="5211360" cy="1918440"/>
           </a:xfrm>
           <a:prstGeom prst="rect">
             <a:avLst/>
@@ -44024,7 +43981,7 @@
         <p:spPr>
           <a:xfrm>
             <a:off x="2160" y="764280"/>
-            <a:ext cx="12188880" cy="459000"/>
+            <a:ext cx="12187080" cy="459000"/>
           </a:xfrm>
           <a:prstGeom prst="rect">
             <a:avLst/>
@@ -44108,7 +44065,7 @@
         <p:spPr>
           <a:xfrm>
             <a:off x="-2160" y="777600"/>
-            <a:ext cx="12193200" cy="459000"/>
+            <a:ext cx="12191400" cy="459000"/>
           </a:xfrm>
           <a:prstGeom prst="rect">
             <a:avLst/>
@@ -44162,7 +44119,7 @@
         <p:spPr>
           <a:xfrm>
             <a:off x="556920" y="5843880"/>
-            <a:ext cx="5367240" cy="454680"/>
+            <a:ext cx="5365440" cy="454680"/>
           </a:xfrm>
           <a:prstGeom prst="rect">
             <a:avLst/>
@@ -44238,7 +44195,7 @@
         </p:nvGraphicFramePr>
         <p:xfrm>
           <a:off x="252000" y="1477440"/>
-          <a:ext cx="11694960" cy="3826440"/>
+          <a:ext cx="11694960" cy="3863880"/>
         </p:xfrm>
         <a:graphic>
           <a:graphicData uri="http://schemas.openxmlformats.org/drawingml/2006/table">
@@ -48287,7 +48244,7 @@
         <p:spPr>
           <a:xfrm>
             <a:off x="3362760" y="2542320"/>
-            <a:ext cx="5213160" cy="1918440"/>
+            <a:ext cx="5211360" cy="1918440"/>
           </a:xfrm>
           <a:prstGeom prst="rect">
             <a:avLst/>
@@ -48359,7 +48316,7 @@
         <p:spPr>
           <a:xfrm>
             <a:off x="2160" y="764280"/>
-            <a:ext cx="12188880" cy="459000"/>
+            <a:ext cx="12187080" cy="459000"/>
           </a:xfrm>
           <a:prstGeom prst="rect">
             <a:avLst/>

</xml_diff>